<commit_message>
prezentacia pre stary ppt a pre novy
prezentacia pre stary ppt a pre novy
</commit_message>
<xml_diff>
--- a/prezentácia-finálna-v2.pptx
+++ b/prezentácia-finálna-v2.pptx
@@ -5,7 +5,7 @@
     <p:sldMasterId id="2147483648" r:id="rId1"/>
   </p:sldMasterIdLst>
   <p:notesMasterIdLst>
-    <p:notesMasterId r:id="rId14"/>
+    <p:notesMasterId r:id="rId13"/>
   </p:notesMasterIdLst>
   <p:sldIdLst>
     <p:sldId id="274" r:id="rId2"/>
@@ -15,11 +15,10 @@
     <p:sldId id="302" r:id="rId6"/>
     <p:sldId id="301" r:id="rId7"/>
     <p:sldId id="297" r:id="rId8"/>
-    <p:sldId id="304" r:id="rId9"/>
-    <p:sldId id="299" r:id="rId10"/>
-    <p:sldId id="295" r:id="rId11"/>
-    <p:sldId id="289" r:id="rId12"/>
-    <p:sldId id="294" r:id="rId13"/>
+    <p:sldId id="299" r:id="rId9"/>
+    <p:sldId id="295" r:id="rId10"/>
+    <p:sldId id="289" r:id="rId11"/>
+    <p:sldId id="294" r:id="rId12"/>
   </p:sldIdLst>
   <p:sldSz cx="12192000" cy="6858000"/>
   <p:notesSz cx="6858000" cy="9144000"/>
@@ -149,7 +148,6 @@
           <p14:sldIdLst>
             <p14:sldId id="301"/>
             <p14:sldId id="297"/>
-            <p14:sldId id="304"/>
             <p14:sldId id="299"/>
           </p14:sldIdLst>
         </p14:section>
@@ -262,7 +260,7 @@
           <a:p>
             <a:fld id="{C88AA305-93E8-483D-AA91-3BB1CFB17019}" type="datetimeFigureOut">
               <a:rPr lang="sk-SK" smtClean="0"/>
-              <a:t>5. 2. 2023</a:t>
+              <a:t>19. 2. 2023</a:t>
             </a:fld>
             <a:endParaRPr lang="sk-SK"/>
           </a:p>
@@ -689,7 +687,7 @@
     </p:spTree>
     <p:extLst>
       <p:ext uri="{BB962C8B-B14F-4D97-AF65-F5344CB8AC3E}">
-        <p14:creationId xmlns:p14="http://schemas.microsoft.com/office/powerpoint/2010/main" val="4216067300"/>
+        <p14:creationId xmlns:p14="http://schemas.microsoft.com/office/powerpoint/2010/main" val="4154464153"/>
       </p:ext>
     </p:extLst>
   </p:cSld>
@@ -766,91 +764,6 @@
             <a:fld id="{BC849E9A-41F7-4779-A581-48A7C374A227}" type="slidenum">
               <a:rPr lang="sk-SK" smtClean="0"/>
               <a:t>11</a:t>
-            </a:fld>
-            <a:endParaRPr lang="sk-SK"/>
-          </a:p>
-        </p:txBody>
-      </p:sp>
-    </p:spTree>
-    <p:extLst>
-      <p:ext uri="{BB962C8B-B14F-4D97-AF65-F5344CB8AC3E}">
-        <p14:creationId xmlns:p14="http://schemas.microsoft.com/office/powerpoint/2010/main" val="4154464153"/>
-      </p:ext>
-    </p:extLst>
-  </p:cSld>
-  <p:clrMapOvr>
-    <a:masterClrMapping/>
-  </p:clrMapOvr>
-</p:notes>
-</file>
-
-<file path=ppt/notesSlides/notesSlide12.xml><?xml version="1.0" encoding="utf-8"?>
-<p:notes xmlns:a="http://schemas.openxmlformats.org/drawingml/2006/main" xmlns:r="http://schemas.openxmlformats.org/officeDocument/2006/relationships" xmlns:p="http://schemas.openxmlformats.org/presentationml/2006/main">
-  <p:cSld>
-    <p:spTree>
-      <p:nvGrpSpPr>
-        <p:cNvPr id="1" name=""/>
-        <p:cNvGrpSpPr/>
-        <p:nvPr/>
-      </p:nvGrpSpPr>
-      <p:grpSpPr>
-        <a:xfrm>
-          <a:off x="0" y="0"/>
-          <a:ext cx="0" cy="0"/>
-          <a:chOff x="0" y="0"/>
-          <a:chExt cx="0" cy="0"/>
-        </a:xfrm>
-      </p:grpSpPr>
-      <p:sp>
-        <p:nvSpPr>
-          <p:cNvPr id="2" name="Zástupný symbol obrázka snímky 1"/>
-          <p:cNvSpPr>
-            <a:spLocks noGrp="1" noRot="1" noChangeAspect="1"/>
-          </p:cNvSpPr>
-          <p:nvPr>
-            <p:ph type="sldImg"/>
-          </p:nvPr>
-        </p:nvSpPr>
-        <p:spPr/>
-      </p:sp>
-      <p:sp>
-        <p:nvSpPr>
-          <p:cNvPr id="3" name="Zástupný symbol poznámok 2"/>
-          <p:cNvSpPr>
-            <a:spLocks noGrp="1"/>
-          </p:cNvSpPr>
-          <p:nvPr>
-            <p:ph type="body" idx="1"/>
-          </p:nvPr>
-        </p:nvSpPr>
-        <p:spPr/>
-        <p:txBody>
-          <a:bodyPr/>
-          <a:lstStyle/>
-          <a:p>
-            <a:endParaRPr lang="sk-SK"/>
-          </a:p>
-        </p:txBody>
-      </p:sp>
-      <p:sp>
-        <p:nvSpPr>
-          <p:cNvPr id="4" name="Zástupný symbol čísla snímky 3"/>
-          <p:cNvSpPr>
-            <a:spLocks noGrp="1"/>
-          </p:cNvSpPr>
-          <p:nvPr>
-            <p:ph type="sldNum" sz="quarter" idx="5"/>
-          </p:nvPr>
-        </p:nvSpPr>
-        <p:spPr/>
-        <p:txBody>
-          <a:bodyPr/>
-          <a:lstStyle/>
-          <a:p>
-            <a:pPr rtl="0"/>
-            <a:fld id="{BC849E9A-41F7-4779-A581-48A7C374A227}" type="slidenum">
-              <a:rPr lang="sk-SK" smtClean="0"/>
-              <a:t>12</a:t>
             </a:fld>
             <a:endParaRPr lang="sk-SK"/>
           </a:p>
@@ -1454,7 +1367,7 @@
     </p:spTree>
     <p:extLst>
       <p:ext uri="{BB962C8B-B14F-4D97-AF65-F5344CB8AC3E}">
-        <p14:creationId xmlns:p14="http://schemas.microsoft.com/office/powerpoint/2010/main" val="2887091530"/>
+        <p14:creationId xmlns:p14="http://schemas.microsoft.com/office/powerpoint/2010/main" val="3877642174"/>
       </p:ext>
     </p:extLst>
   </p:cSld>
@@ -1539,7 +1452,7 @@
     </p:spTree>
     <p:extLst>
       <p:ext uri="{BB962C8B-B14F-4D97-AF65-F5344CB8AC3E}">
-        <p14:creationId xmlns:p14="http://schemas.microsoft.com/office/powerpoint/2010/main" val="3877642174"/>
+        <p14:creationId xmlns:p14="http://schemas.microsoft.com/office/powerpoint/2010/main" val="4216067300"/>
       </p:ext>
     </p:extLst>
   </p:cSld>
@@ -1696,7 +1609,7 @@
           <a:p>
             <a:fld id="{0DE0741B-E58B-4A9A-A707-9C4095F9C37B}" type="datetimeFigureOut">
               <a:rPr lang="sk-SK" smtClean="0"/>
-              <a:t>5. 2. 2023</a:t>
+              <a:t>19. 2. 2023</a:t>
             </a:fld>
             <a:endParaRPr lang="sk-SK"/>
           </a:p>
@@ -1894,7 +1807,7 @@
           <a:p>
             <a:fld id="{0DE0741B-E58B-4A9A-A707-9C4095F9C37B}" type="datetimeFigureOut">
               <a:rPr lang="sk-SK" smtClean="0"/>
-              <a:t>5. 2. 2023</a:t>
+              <a:t>19. 2. 2023</a:t>
             </a:fld>
             <a:endParaRPr lang="sk-SK"/>
           </a:p>
@@ -2102,7 +2015,7 @@
           <a:p>
             <a:fld id="{0DE0741B-E58B-4A9A-A707-9C4095F9C37B}" type="datetimeFigureOut">
               <a:rPr lang="sk-SK" smtClean="0"/>
-              <a:t>5. 2. 2023</a:t>
+              <a:t>19. 2. 2023</a:t>
             </a:fld>
             <a:endParaRPr lang="sk-SK"/>
           </a:p>
@@ -2300,7 +2213,7 @@
           <a:p>
             <a:fld id="{0DE0741B-E58B-4A9A-A707-9C4095F9C37B}" type="datetimeFigureOut">
               <a:rPr lang="sk-SK" smtClean="0"/>
-              <a:t>5. 2. 2023</a:t>
+              <a:t>19. 2. 2023</a:t>
             </a:fld>
             <a:endParaRPr lang="sk-SK"/>
           </a:p>
@@ -2575,7 +2488,7 @@
           <a:p>
             <a:fld id="{0DE0741B-E58B-4A9A-A707-9C4095F9C37B}" type="datetimeFigureOut">
               <a:rPr lang="sk-SK" smtClean="0"/>
-              <a:t>5. 2. 2023</a:t>
+              <a:t>19. 2. 2023</a:t>
             </a:fld>
             <a:endParaRPr lang="sk-SK"/>
           </a:p>
@@ -2840,7 +2753,7 @@
           <a:p>
             <a:fld id="{0DE0741B-E58B-4A9A-A707-9C4095F9C37B}" type="datetimeFigureOut">
               <a:rPr lang="sk-SK" smtClean="0"/>
-              <a:t>5. 2. 2023</a:t>
+              <a:t>19. 2. 2023</a:t>
             </a:fld>
             <a:endParaRPr lang="sk-SK"/>
           </a:p>
@@ -3252,7 +3165,7 @@
           <a:p>
             <a:fld id="{0DE0741B-E58B-4A9A-A707-9C4095F9C37B}" type="datetimeFigureOut">
               <a:rPr lang="sk-SK" smtClean="0"/>
-              <a:t>5. 2. 2023</a:t>
+              <a:t>19. 2. 2023</a:t>
             </a:fld>
             <a:endParaRPr lang="sk-SK"/>
           </a:p>
@@ -3393,7 +3306,7 @@
           <a:p>
             <a:fld id="{0DE0741B-E58B-4A9A-A707-9C4095F9C37B}" type="datetimeFigureOut">
               <a:rPr lang="sk-SK" smtClean="0"/>
-              <a:t>5. 2. 2023</a:t>
+              <a:t>19. 2. 2023</a:t>
             </a:fld>
             <a:endParaRPr lang="sk-SK"/>
           </a:p>
@@ -3506,7 +3419,7 @@
           <a:p>
             <a:fld id="{0DE0741B-E58B-4A9A-A707-9C4095F9C37B}" type="datetimeFigureOut">
               <a:rPr lang="sk-SK" smtClean="0"/>
-              <a:t>5. 2. 2023</a:t>
+              <a:t>19. 2. 2023</a:t>
             </a:fld>
             <a:endParaRPr lang="sk-SK"/>
           </a:p>
@@ -3817,7 +3730,7 @@
           <a:p>
             <a:fld id="{0DE0741B-E58B-4A9A-A707-9C4095F9C37B}" type="datetimeFigureOut">
               <a:rPr lang="sk-SK" smtClean="0"/>
-              <a:t>5. 2. 2023</a:t>
+              <a:t>19. 2. 2023</a:t>
             </a:fld>
             <a:endParaRPr lang="sk-SK"/>
           </a:p>
@@ -4105,7 +4018,7 @@
           <a:p>
             <a:fld id="{0DE0741B-E58B-4A9A-A707-9C4095F9C37B}" type="datetimeFigureOut">
               <a:rPr lang="sk-SK" smtClean="0"/>
-              <a:t>5. 2. 2023</a:t>
+              <a:t>19. 2. 2023</a:t>
             </a:fld>
             <a:endParaRPr lang="sk-SK"/>
           </a:p>
@@ -4346,7 +4259,7 @@
           <a:p>
             <a:fld id="{0DE0741B-E58B-4A9A-A707-9C4095F9C37B}" type="datetimeFigureOut">
               <a:rPr lang="sk-SK" smtClean="0"/>
-              <a:t>5. 2. 2023</a:t>
+              <a:t>19. 2. 2023</a:t>
             </a:fld>
             <a:endParaRPr lang="sk-SK"/>
           </a:p>
@@ -5751,498 +5664,6 @@
         </p:nvSpPr>
         <p:spPr>
           <a:xfrm>
-            <a:off x="706971" y="728558"/>
-            <a:ext cx="7537894" cy="506077"/>
-          </a:xfrm>
-          <a:prstGeom prst="rect">
-            <a:avLst/>
-          </a:prstGeom>
-        </p:spPr>
-        <p:txBody>
-          <a:bodyPr vert="horz" lIns="91440" tIns="45720" rIns="91440" bIns="45720" rtlCol="0" anchor="t">
-            <a:noAutofit/>
-          </a:bodyPr>
-          <a:lstStyle>
-            <a:lvl1pPr algn="ctr" defTabSz="914400" rtl="0" eaLnBrk="1" latinLnBrk="0" hangingPunct="1">
-              <a:lnSpc>
-                <a:spcPct val="90000"/>
-              </a:lnSpc>
-              <a:spcBef>
-                <a:spcPct val="0"/>
-              </a:spcBef>
-              <a:buNone/>
-              <a:defRPr sz="6000" kern="1200">
-                <a:solidFill>
-                  <a:schemeClr val="tx1"/>
-                </a:solidFill>
-                <a:latin typeface="+mj-lt"/>
-                <a:ea typeface="+mj-ea"/>
-                <a:cs typeface="+mj-cs"/>
-              </a:defRPr>
-            </a:lvl1pPr>
-          </a:lstStyle>
-          <a:p>
-            <a:pPr algn="l"/>
-            <a:r>
-              <a:rPr lang="sk-SK" sz="6600" dirty="0">
-                <a:solidFill>
-                  <a:schemeClr val="bg1"/>
-                </a:solidFill>
-                <a:latin typeface="Lucida Console" panose="020B0609040504020204" pitchFamily="49" charset="0"/>
-                <a:cs typeface="Segoe UI" panose="020B0502040204020203" pitchFamily="34" charset="0"/>
-              </a:rPr>
-              <a:t>SPÄTNÁ VÄZBA</a:t>
-            </a:r>
-          </a:p>
-        </p:txBody>
-      </p:sp>
-      <p:sp>
-        <p:nvSpPr>
-          <p:cNvPr id="3" name="Obdĺžnik 2">
-            <a:extLst>
-              <a:ext uri="{FF2B5EF4-FFF2-40B4-BE49-F238E27FC236}">
-                <a16:creationId xmlns:a16="http://schemas.microsoft.com/office/drawing/2014/main" id="{9B90B492-1089-E563-F867-BD916C7A9F10}"/>
-              </a:ext>
-            </a:extLst>
-          </p:cNvPr>
-          <p:cNvSpPr/>
-          <p:nvPr/>
-        </p:nvSpPr>
-        <p:spPr>
-          <a:xfrm rot="16200000">
-            <a:off x="6994112" y="2376149"/>
-            <a:ext cx="9220123" cy="2105702"/>
-          </a:xfrm>
-          <a:prstGeom prst="rect">
-            <a:avLst/>
-          </a:prstGeom>
-          <a:gradFill>
-            <a:gsLst>
-              <a:gs pos="35000">
-                <a:srgbClr val="CCFF99">
-                  <a:lumMod val="96000"/>
-                </a:srgbClr>
-              </a:gs>
-              <a:gs pos="66000">
-                <a:schemeClr val="accent1"/>
-              </a:gs>
-            </a:gsLst>
-            <a:path path="circle">
-              <a:fillToRect l="100000" b="100000"/>
-            </a:path>
-          </a:gradFill>
-          <a:ln>
-            <a:noFill/>
-          </a:ln>
-        </p:spPr>
-        <p:style>
-          <a:lnRef idx="2">
-            <a:schemeClr val="accent1">
-              <a:shade val="50000"/>
-            </a:schemeClr>
-          </a:lnRef>
-          <a:fillRef idx="1">
-            <a:schemeClr val="accent1"/>
-          </a:fillRef>
-          <a:effectRef idx="0">
-            <a:schemeClr val="accent1"/>
-          </a:effectRef>
-          <a:fontRef idx="minor">
-            <a:schemeClr val="lt1"/>
-          </a:fontRef>
-        </p:style>
-        <p:txBody>
-          <a:bodyPr rtlCol="0" anchor="ctr"/>
-          <a:lstStyle/>
-          <a:p>
-            <a:pPr algn="ctr"/>
-            <a:endParaRPr lang="sk-SK"/>
-          </a:p>
-        </p:txBody>
-      </p:sp>
-      <p:pic>
-        <p:nvPicPr>
-          <p:cNvPr id="16" name="Graphic 7">
-            <a:extLst>
-              <a:ext uri="{FF2B5EF4-FFF2-40B4-BE49-F238E27FC236}">
-                <a16:creationId xmlns:a16="http://schemas.microsoft.com/office/drawing/2014/main" id="{1CEA1227-056B-947D-5534-D541F18D68DB}"/>
-              </a:ext>
-            </a:extLst>
-          </p:cNvPr>
-          <p:cNvPicPr>
-            <a:picLocks noChangeAspect="1"/>
-          </p:cNvPicPr>
-          <p:nvPr/>
-        </p:nvPicPr>
-        <p:blipFill>
-          <a:blip r:embed="rId3" cstate="email">
-            <a:extLst>
-              <a:ext uri="{28A0092B-C50C-407E-A947-70E740481C1C}">
-                <a14:useLocalDpi xmlns:a14="http://schemas.microsoft.com/office/drawing/2010/main"/>
-              </a:ext>
-              <a:ext uri="{96DAC541-7B7A-43D3-8B79-37D633B846F1}">
-                <asvg:svgBlip xmlns:asvg="http://schemas.microsoft.com/office/drawing/2016/SVG/main" r:embed="rId4"/>
-              </a:ext>
-            </a:extLst>
-          </a:blip>
-          <a:stretch>
-            <a:fillRect/>
-          </a:stretch>
-        </p:blipFill>
-        <p:spPr>
-          <a:xfrm rot="5400000" flipV="1">
-            <a:off x="7064697" y="3299698"/>
-            <a:ext cx="6572253" cy="239558"/>
-          </a:xfrm>
-          <a:prstGeom prst="rect">
-            <a:avLst/>
-          </a:prstGeom>
-        </p:spPr>
-      </p:pic>
-      <p:sp>
-        <p:nvSpPr>
-          <p:cNvPr id="12" name="Nadpis 1">
-            <a:extLst>
-              <a:ext uri="{FF2B5EF4-FFF2-40B4-BE49-F238E27FC236}">
-                <a16:creationId xmlns:a16="http://schemas.microsoft.com/office/drawing/2014/main" id="{373E9CF8-810A-B420-CAB9-95D61B53A7EB}"/>
-              </a:ext>
-            </a:extLst>
-          </p:cNvPr>
-          <p:cNvSpPr txBox="1">
-            <a:spLocks/>
-          </p:cNvSpPr>
-          <p:nvPr/>
-        </p:nvSpPr>
-        <p:spPr>
-          <a:xfrm>
-            <a:off x="490462" y="2160061"/>
-            <a:ext cx="9275557" cy="3750844"/>
-          </a:xfrm>
-          <a:prstGeom prst="rect">
-            <a:avLst/>
-          </a:prstGeom>
-        </p:spPr>
-        <p:txBody>
-          <a:bodyPr vert="horz" lIns="91440" tIns="45720" rIns="91440" bIns="45720" rtlCol="0" anchor="t">
-            <a:noAutofit/>
-          </a:bodyPr>
-          <a:lstStyle>
-            <a:lvl1pPr algn="ctr" defTabSz="914400" rtl="0" eaLnBrk="1" latinLnBrk="0" hangingPunct="1">
-              <a:lnSpc>
-                <a:spcPct val="90000"/>
-              </a:lnSpc>
-              <a:spcBef>
-                <a:spcPct val="0"/>
-              </a:spcBef>
-              <a:buNone/>
-              <a:defRPr sz="6000" kern="1200">
-                <a:solidFill>
-                  <a:schemeClr val="tx1"/>
-                </a:solidFill>
-                <a:latin typeface="+mj-lt"/>
-                <a:ea typeface="+mj-ea"/>
-                <a:cs typeface="+mj-cs"/>
-              </a:defRPr>
-            </a:lvl1pPr>
-          </a:lstStyle>
-          <a:p>
-            <a:pPr algn="l"/>
-            <a:r>
-              <a:rPr lang="sk-SK" sz="2400" dirty="0">
-                <a:solidFill>
-                  <a:schemeClr val="bg1"/>
-                </a:solidFill>
-                <a:effectLst/>
-                <a:latin typeface="Lucida Console" panose="020B0609040504020204" pitchFamily="49" charset="0"/>
-              </a:rPr>
-              <a:t>Spätná väzba zahŕňa:</a:t>
-            </a:r>
-          </a:p>
-          <a:p>
-            <a:pPr algn="l"/>
-            <a:endParaRPr lang="sk-SK" sz="1800" dirty="0">
-              <a:solidFill>
-                <a:schemeClr val="bg1"/>
-              </a:solidFill>
-              <a:latin typeface="Lucida Console" panose="020B0609040504020204" pitchFamily="49" charset="0"/>
-            </a:endParaRPr>
-          </a:p>
-          <a:p>
-            <a:pPr algn="l"/>
-            <a:endParaRPr lang="sk-SK" sz="1800" dirty="0">
-              <a:solidFill>
-                <a:schemeClr val="bg1"/>
-              </a:solidFill>
-              <a:latin typeface="Lucida Console" panose="020B0609040504020204" pitchFamily="49" charset="0"/>
-            </a:endParaRPr>
-          </a:p>
-          <a:p>
-            <a:pPr algn="l">
-              <a:lnSpc>
-                <a:spcPct val="100000"/>
-              </a:lnSpc>
-              <a:spcBef>
-                <a:spcPts val="300"/>
-              </a:spcBef>
-            </a:pPr>
-            <a:r>
-              <a:rPr lang="sk-SK" sz="1800" dirty="0">
-                <a:solidFill>
-                  <a:schemeClr val="bg1"/>
-                </a:solidFill>
-                <a:effectLst/>
-                <a:latin typeface="Lucida Console" panose="020B0609040504020204" pitchFamily="49" charset="0"/>
-              </a:rPr>
-              <a:t>   -kontrolu pracovných listov na našich spolužiakoch</a:t>
-            </a:r>
-            <a:endParaRPr lang="sk-SK" sz="1800" dirty="0">
-              <a:solidFill>
-                <a:schemeClr val="bg1"/>
-              </a:solidFill>
-              <a:latin typeface="Lucida Console" panose="020B0609040504020204" pitchFamily="49" charset="0"/>
-            </a:endParaRPr>
-          </a:p>
-          <a:p>
-            <a:pPr algn="l">
-              <a:lnSpc>
-                <a:spcPct val="100000"/>
-              </a:lnSpc>
-              <a:spcBef>
-                <a:spcPts val="300"/>
-              </a:spcBef>
-            </a:pPr>
-            <a:endParaRPr lang="sk-SK" sz="1800" dirty="0">
-              <a:solidFill>
-                <a:schemeClr val="bg1"/>
-              </a:solidFill>
-              <a:effectLst/>
-              <a:latin typeface="Lucida Console" panose="020B0609040504020204" pitchFamily="49" charset="0"/>
-            </a:endParaRPr>
-          </a:p>
-          <a:p>
-            <a:pPr algn="l">
-              <a:lnSpc>
-                <a:spcPct val="100000"/>
-              </a:lnSpc>
-              <a:spcBef>
-                <a:spcPts val="300"/>
-              </a:spcBef>
-            </a:pPr>
-            <a:r>
-              <a:rPr lang="sk-SK" sz="1800" dirty="0">
-                <a:solidFill>
-                  <a:schemeClr val="bg1"/>
-                </a:solidFill>
-                <a:effectLst/>
-                <a:latin typeface="Lucida Console" panose="020B0609040504020204" pitchFamily="49" charset="0"/>
-              </a:rPr>
-              <a:t>   -vyplnenie dotazníka spolužiakmi</a:t>
-            </a:r>
-          </a:p>
-          <a:p>
-            <a:pPr algn="l">
-              <a:lnSpc>
-                <a:spcPct val="100000"/>
-              </a:lnSpc>
-              <a:spcBef>
-                <a:spcPts val="300"/>
-              </a:spcBef>
-            </a:pPr>
-            <a:endParaRPr lang="sk-SK" sz="1800" dirty="0">
-              <a:solidFill>
-                <a:schemeClr val="bg1"/>
-              </a:solidFill>
-              <a:latin typeface="Lucida Console" panose="020B0609040504020204" pitchFamily="49" charset="0"/>
-            </a:endParaRPr>
-          </a:p>
-          <a:p>
-            <a:pPr algn="l">
-              <a:lnSpc>
-                <a:spcPct val="100000"/>
-              </a:lnSpc>
-              <a:spcBef>
-                <a:spcPts val="300"/>
-              </a:spcBef>
-            </a:pPr>
-            <a:r>
-              <a:rPr lang="sk-SK" sz="1800" dirty="0">
-                <a:solidFill>
-                  <a:schemeClr val="bg1"/>
-                </a:solidFill>
-                <a:latin typeface="Lucida Console" panose="020B0609040504020204" pitchFamily="49" charset="0"/>
-              </a:rPr>
-              <a:t>   -vyhodnotenie pripomienok spolužiakov</a:t>
-            </a:r>
-          </a:p>
-          <a:p>
-            <a:pPr algn="l">
-              <a:lnSpc>
-                <a:spcPct val="100000"/>
-              </a:lnSpc>
-              <a:spcBef>
-                <a:spcPts val="300"/>
-              </a:spcBef>
-            </a:pPr>
-            <a:endParaRPr lang="sk-SK" sz="1800" dirty="0">
-              <a:solidFill>
-                <a:schemeClr val="bg1"/>
-              </a:solidFill>
-              <a:effectLst/>
-              <a:latin typeface="Lucida Console" panose="020B0609040504020204" pitchFamily="49" charset="0"/>
-            </a:endParaRPr>
-          </a:p>
-          <a:p>
-            <a:pPr algn="l">
-              <a:lnSpc>
-                <a:spcPct val="100000"/>
-              </a:lnSpc>
-              <a:spcBef>
-                <a:spcPts val="300"/>
-              </a:spcBef>
-            </a:pPr>
-            <a:r>
-              <a:rPr lang="sk-SK" sz="1800" dirty="0">
-                <a:solidFill>
-                  <a:schemeClr val="bg1"/>
-                </a:solidFill>
-                <a:effectLst/>
-                <a:latin typeface="Lucida Console" panose="020B0609040504020204" pitchFamily="49" charset="0"/>
-              </a:rPr>
-              <a:t>   -úprava pracovných listov podľa výsledkov z dotazníka</a:t>
-            </a:r>
-          </a:p>
-        </p:txBody>
-      </p:sp>
-    </p:spTree>
-    <p:extLst>
-      <p:ext uri="{BB962C8B-B14F-4D97-AF65-F5344CB8AC3E}">
-        <p14:creationId xmlns:p14="http://schemas.microsoft.com/office/powerpoint/2010/main" val="2186824041"/>
-      </p:ext>
-    </p:extLst>
-  </p:cSld>
-  <p:clrMapOvr>
-    <a:masterClrMapping/>
-  </p:clrMapOvr>
-  <mc:AlternateContent xmlns:mc="http://schemas.openxmlformats.org/markup-compatibility/2006" xmlns:p159="http://schemas.microsoft.com/office/powerpoint/2015/09/main">
-    <mc:Choice Requires="p159">
-      <p:transition xmlns:p14="http://schemas.microsoft.com/office/powerpoint/2010/main" spd="slow" p14:dur="2000">
-        <p159:morph option="byObject"/>
-      </p:transition>
-    </mc:Choice>
-    <mc:Fallback xmlns="">
-      <p:transition spd="slow">
-        <p:fade/>
-      </p:transition>
-    </mc:Fallback>
-  </mc:AlternateContent>
-</p:sld>
-</file>
-
-<file path=ppt/slides/slide11.xml><?xml version="1.0" encoding="utf-8"?>
-<p:sld xmlns:a="http://schemas.openxmlformats.org/drawingml/2006/main" xmlns:r="http://schemas.openxmlformats.org/officeDocument/2006/relationships" xmlns:p="http://schemas.openxmlformats.org/presentationml/2006/main">
-  <p:cSld>
-    <p:spTree>
-      <p:nvGrpSpPr>
-        <p:cNvPr id="1" name=""/>
-        <p:cNvGrpSpPr/>
-        <p:nvPr/>
-      </p:nvGrpSpPr>
-      <p:grpSpPr>
-        <a:xfrm>
-          <a:off x="0" y="0"/>
-          <a:ext cx="0" cy="0"/>
-          <a:chOff x="0" y="0"/>
-          <a:chExt cx="0" cy="0"/>
-        </a:xfrm>
-      </p:grpSpPr>
-      <p:sp>
-        <p:nvSpPr>
-          <p:cNvPr id="20" name="Obdĺžnik 19">
-            <a:extLst>
-              <a:ext uri="{FF2B5EF4-FFF2-40B4-BE49-F238E27FC236}">
-                <a16:creationId xmlns:a16="http://schemas.microsoft.com/office/drawing/2014/main" id="{EBFF46E7-F9DA-1A54-EFB2-F25F480E68D9}"/>
-              </a:ext>
-            </a:extLst>
-          </p:cNvPr>
-          <p:cNvSpPr/>
-          <p:nvPr/>
-        </p:nvSpPr>
-        <p:spPr>
-          <a:xfrm>
-            <a:off x="-1" y="0"/>
-            <a:ext cx="12192001" cy="6858000"/>
-          </a:xfrm>
-          <a:prstGeom prst="rect">
-            <a:avLst/>
-          </a:prstGeom>
-          <a:gradFill flip="none" rotWithShape="1">
-            <a:gsLst>
-              <a:gs pos="74000">
-                <a:srgbClr val="272727"/>
-              </a:gs>
-              <a:gs pos="0">
-                <a:schemeClr val="tx1">
-                  <a:lumMod val="95000"/>
-                  <a:lumOff val="5000"/>
-                </a:schemeClr>
-              </a:gs>
-              <a:gs pos="100000">
-                <a:schemeClr val="tx1">
-                  <a:lumMod val="75000"/>
-                  <a:lumOff val="25000"/>
-                </a:schemeClr>
-              </a:gs>
-            </a:gsLst>
-            <a:path path="circle">
-              <a:fillToRect l="100000" b="100000"/>
-            </a:path>
-            <a:tileRect t="-100000" r="-100000"/>
-          </a:gradFill>
-          <a:ln>
-            <a:noFill/>
-          </a:ln>
-        </p:spPr>
-        <p:style>
-          <a:lnRef idx="2">
-            <a:schemeClr val="accent1">
-              <a:shade val="50000"/>
-            </a:schemeClr>
-          </a:lnRef>
-          <a:fillRef idx="1">
-            <a:schemeClr val="accent1"/>
-          </a:fillRef>
-          <a:effectRef idx="0">
-            <a:schemeClr val="accent1"/>
-          </a:effectRef>
-          <a:fontRef idx="minor">
-            <a:schemeClr val="lt1"/>
-          </a:fontRef>
-        </p:style>
-        <p:txBody>
-          <a:bodyPr rtlCol="0" anchor="ctr"/>
-          <a:lstStyle/>
-          <a:p>
-            <a:pPr algn="ctr"/>
-            <a:endParaRPr lang="sk-SK" dirty="0"/>
-          </a:p>
-        </p:txBody>
-      </p:sp>
-      <p:sp>
-        <p:nvSpPr>
-          <p:cNvPr id="13" name="Nadpis 1">
-            <a:extLst>
-              <a:ext uri="{FF2B5EF4-FFF2-40B4-BE49-F238E27FC236}">
-                <a16:creationId xmlns:a16="http://schemas.microsoft.com/office/drawing/2014/main" id="{C844EE25-6FED-2F6C-6DF0-37669AEDC5F3}"/>
-              </a:ext>
-            </a:extLst>
-          </p:cNvPr>
-          <p:cNvSpPr txBox="1">
-            <a:spLocks/>
-          </p:cNvSpPr>
-          <p:nvPr/>
-        </p:nvSpPr>
-        <p:spPr>
-          <a:xfrm>
             <a:off x="7517276" y="1241412"/>
             <a:ext cx="3063027" cy="506077"/>
           </a:xfrm>
@@ -7086,7 +6507,7 @@
 </p:sld>
 </file>
 
-<file path=ppt/slides/slide12.xml><?xml version="1.0" encoding="utf-8"?>
+<file path=ppt/slides/slide11.xml><?xml version="1.0" encoding="utf-8"?>
 <p:sld xmlns:a="http://schemas.openxmlformats.org/drawingml/2006/main" xmlns:r="http://schemas.openxmlformats.org/officeDocument/2006/relationships" xmlns:p="http://schemas.openxmlformats.org/presentationml/2006/main">
   <p:cSld>
     <p:spTree>
@@ -13792,134 +13213,6 @@
       </p:sp>
       <p:sp>
         <p:nvSpPr>
-          <p:cNvPr id="4" name="Obdĺžnik 3">
-            <a:extLst>
-              <a:ext uri="{FF2B5EF4-FFF2-40B4-BE49-F238E27FC236}">
-                <a16:creationId xmlns:a16="http://schemas.microsoft.com/office/drawing/2014/main" id="{BFA3DE68-F7C6-AD22-EA12-74D596C9B78E}"/>
-              </a:ext>
-            </a:extLst>
-          </p:cNvPr>
-          <p:cNvSpPr/>
-          <p:nvPr/>
-        </p:nvSpPr>
-        <p:spPr>
-          <a:xfrm rot="20045164">
-            <a:off x="-2432936" y="2583476"/>
-            <a:ext cx="16470863" cy="532110"/>
-          </a:xfrm>
-          <a:prstGeom prst="rect">
-            <a:avLst/>
-          </a:prstGeom>
-          <a:gradFill>
-            <a:gsLst>
-              <a:gs pos="35000">
-                <a:srgbClr val="CCFF99">
-                  <a:lumMod val="96000"/>
-                </a:srgbClr>
-              </a:gs>
-              <a:gs pos="66000">
-                <a:schemeClr val="accent1"/>
-              </a:gs>
-            </a:gsLst>
-            <a:path path="circle">
-              <a:fillToRect l="100000" b="100000"/>
-            </a:path>
-          </a:gradFill>
-          <a:ln>
-            <a:noFill/>
-          </a:ln>
-        </p:spPr>
-        <p:style>
-          <a:lnRef idx="2">
-            <a:schemeClr val="accent1">
-              <a:shade val="50000"/>
-            </a:schemeClr>
-          </a:lnRef>
-          <a:fillRef idx="1">
-            <a:schemeClr val="accent1"/>
-          </a:fillRef>
-          <a:effectRef idx="0">
-            <a:schemeClr val="accent1"/>
-          </a:effectRef>
-          <a:fontRef idx="minor">
-            <a:schemeClr val="lt1"/>
-          </a:fontRef>
-        </p:style>
-        <p:txBody>
-          <a:bodyPr rtlCol="0" anchor="ctr"/>
-          <a:lstStyle/>
-          <a:p>
-            <a:pPr algn="ctr"/>
-            <a:endParaRPr lang="sk-SK"/>
-          </a:p>
-        </p:txBody>
-      </p:sp>
-      <p:sp>
-        <p:nvSpPr>
-          <p:cNvPr id="5" name="Obdĺžnik 4">
-            <a:extLst>
-              <a:ext uri="{FF2B5EF4-FFF2-40B4-BE49-F238E27FC236}">
-                <a16:creationId xmlns:a16="http://schemas.microsoft.com/office/drawing/2014/main" id="{FC407B1A-A91C-A488-BF24-5BA273BEC60B}"/>
-              </a:ext>
-            </a:extLst>
-          </p:cNvPr>
-          <p:cNvSpPr/>
-          <p:nvPr/>
-        </p:nvSpPr>
-        <p:spPr>
-          <a:xfrm rot="20045164">
-            <a:off x="-1988805" y="3143311"/>
-            <a:ext cx="16007020" cy="228477"/>
-          </a:xfrm>
-          <a:prstGeom prst="rect">
-            <a:avLst/>
-          </a:prstGeom>
-          <a:gradFill>
-            <a:gsLst>
-              <a:gs pos="35000">
-                <a:srgbClr val="CCFF99">
-                  <a:lumMod val="96000"/>
-                </a:srgbClr>
-              </a:gs>
-              <a:gs pos="66000">
-                <a:schemeClr val="accent1"/>
-              </a:gs>
-            </a:gsLst>
-            <a:path path="circle">
-              <a:fillToRect l="100000" b="100000"/>
-            </a:path>
-          </a:gradFill>
-          <a:ln>
-            <a:noFill/>
-          </a:ln>
-        </p:spPr>
-        <p:style>
-          <a:lnRef idx="2">
-            <a:schemeClr val="accent1">
-              <a:shade val="50000"/>
-            </a:schemeClr>
-          </a:lnRef>
-          <a:fillRef idx="1">
-            <a:schemeClr val="accent1"/>
-          </a:fillRef>
-          <a:effectRef idx="0">
-            <a:schemeClr val="accent1"/>
-          </a:effectRef>
-          <a:fontRef idx="minor">
-            <a:schemeClr val="lt1"/>
-          </a:fontRef>
-        </p:style>
-        <p:txBody>
-          <a:bodyPr rtlCol="0" anchor="ctr"/>
-          <a:lstStyle/>
-          <a:p>
-            <a:pPr algn="ctr"/>
-            <a:endParaRPr lang="sk-SK"/>
-          </a:p>
-        </p:txBody>
-      </p:sp>
-      <p:sp>
-        <p:nvSpPr>
           <p:cNvPr id="13" name="Nadpis 1">
             <a:extLst>
               <a:ext uri="{FF2B5EF4-FFF2-40B4-BE49-F238E27FC236}">
@@ -13934,8 +13227,8 @@
         </p:nvSpPr>
         <p:spPr>
           <a:xfrm>
-            <a:off x="706971" y="728558"/>
-            <a:ext cx="4379379" cy="506077"/>
+            <a:off x="1335621" y="1033358"/>
+            <a:ext cx="10096798" cy="506077"/>
           </a:xfrm>
           <a:prstGeom prst="rect">
             <a:avLst/>
@@ -13965,7 +13258,7 @@
             </a:lvl1pPr>
           </a:lstStyle>
           <a:p>
-            <a:pPr algn="l"/>
+            <a:pPr algn="r"/>
             <a:r>
               <a:rPr lang="sk-SK" sz="6600" dirty="0">
                 <a:solidFill>
@@ -13974,59 +13267,82 @@
                 <a:latin typeface="Lucida Console" panose="020B0609040504020204" pitchFamily="49" charset="0"/>
                 <a:cs typeface="Segoe UI" panose="020B0502040204020203" pitchFamily="34" charset="0"/>
               </a:rPr>
-              <a:t>PRACOVNÉ    LISTY</a:t>
-            </a:r>
-          </a:p>
-        </p:txBody>
-      </p:sp>
-      <p:sp>
-        <p:nvSpPr>
-          <p:cNvPr id="6" name="BlokTextu 5">
-            <a:extLst>
-              <a:ext uri="{FF2B5EF4-FFF2-40B4-BE49-F238E27FC236}">
-                <a16:creationId xmlns:a16="http://schemas.microsoft.com/office/drawing/2014/main" id="{7BA26F74-A0F2-7AB5-9C0F-BE2EE46110B4}"/>
-              </a:ext>
-            </a:extLst>
-          </p:cNvPr>
-          <p:cNvSpPr txBox="1"/>
+              <a:t>TEORETICKÉ</a:t>
+            </a:r>
+          </a:p>
+          <a:p>
+            <a:pPr algn="r"/>
+            <a:r>
+              <a:rPr lang="sk-SK" sz="6600" dirty="0">
+                <a:solidFill>
+                  <a:schemeClr val="bg1"/>
+                </a:solidFill>
+                <a:latin typeface="Lucida Console" panose="020B0609040504020204" pitchFamily="49" charset="0"/>
+                <a:cs typeface="Segoe UI" panose="020B0502040204020203" pitchFamily="34" charset="0"/>
+              </a:rPr>
+              <a:t>			PRACOVNÉ  	 	</a:t>
+            </a:r>
+          </a:p>
+          <a:p>
+            <a:pPr algn="r"/>
+            <a:r>
+              <a:rPr lang="sk-SK" sz="6600" dirty="0">
+                <a:solidFill>
+                  <a:schemeClr val="bg1"/>
+                </a:solidFill>
+                <a:latin typeface="Lucida Console" panose="020B0609040504020204" pitchFamily="49" charset="0"/>
+                <a:cs typeface="Segoe UI" panose="020B0502040204020203" pitchFamily="34" charset="0"/>
+              </a:rPr>
+              <a:t>LISTY					  </a:t>
+            </a:r>
+          </a:p>
+        </p:txBody>
+      </p:sp>
+      <p:pic>
+        <p:nvPicPr>
+          <p:cNvPr id="3" name="Graphic 7">
+            <a:extLst>
+              <a:ext uri="{FF2B5EF4-FFF2-40B4-BE49-F238E27FC236}">
+                <a16:creationId xmlns:a16="http://schemas.microsoft.com/office/drawing/2014/main" id="{4B0E62A6-8B7A-7BE9-47A6-CBD705143B10}"/>
+              </a:ext>
+            </a:extLst>
+          </p:cNvPr>
+          <p:cNvPicPr>
+            <a:picLocks noChangeAspect="1"/>
+          </p:cNvPicPr>
           <p:nvPr/>
-        </p:nvSpPr>
-        <p:spPr>
-          <a:xfrm rot="16200000">
-            <a:off x="-835323" y="3320821"/>
-            <a:ext cx="3033788" cy="369332"/>
+        </p:nvPicPr>
+        <p:blipFill>
+          <a:blip r:embed="rId3" cstate="email">
+            <a:extLst>
+              <a:ext uri="{28A0092B-C50C-407E-A947-70E740481C1C}">
+                <a14:useLocalDpi xmlns:a14="http://schemas.microsoft.com/office/drawing/2010/main"/>
+              </a:ext>
+              <a:ext uri="{96DAC541-7B7A-43D3-8B79-37D633B846F1}">
+                <asvg:svgBlip xmlns:asvg="http://schemas.microsoft.com/office/drawing/2016/SVG/main" r:embed="rId4"/>
+              </a:ext>
+            </a:extLst>
+          </a:blip>
+          <a:stretch>
+            <a:fillRect/>
+          </a:stretch>
+        </p:blipFill>
+        <p:spPr>
+          <a:xfrm rot="9275962">
+            <a:off x="6976439" y="2744195"/>
+            <a:ext cx="4880564" cy="177896"/>
           </a:xfrm>
           <a:prstGeom prst="rect">
             <a:avLst/>
           </a:prstGeom>
-          <a:noFill/>
-        </p:spPr>
-        <p:txBody>
-          <a:bodyPr wrap="square" rtlCol="0">
-            <a:spAutoFit/>
-          </a:bodyPr>
-          <a:lstStyle/>
-          <a:p>
-            <a:r>
-              <a:rPr lang="sk-SK" sz="1800" dirty="0">
-                <a:solidFill>
-                  <a:schemeClr val="bg1"/>
-                </a:solidFill>
-                <a:effectLst/>
-                <a:latin typeface="Lucida Console" panose="020B0609040504020204" pitchFamily="49" charset="0"/>
-              </a:rPr>
-              <a:t>Praktický list</a:t>
-            </a:r>
-            <a:endParaRPr lang="sk-SK" dirty="0"/>
-          </a:p>
-        </p:txBody>
-      </p:sp>
-      <p:sp>
-        <p:nvSpPr>
-          <p:cNvPr id="2" name="BlokTextu 1">
-            <a:extLst>
-              <a:ext uri="{FF2B5EF4-FFF2-40B4-BE49-F238E27FC236}">
-                <a16:creationId xmlns:a16="http://schemas.microsoft.com/office/drawing/2014/main" id="{285A0554-B2AC-E846-6DB1-2D25ED6FD4DE}"/>
+        </p:spPr>
+      </p:pic>
+      <p:sp>
+        <p:nvSpPr>
+          <p:cNvPr id="6" name="BlokTextu 5">
+            <a:extLst>
+              <a:ext uri="{FF2B5EF4-FFF2-40B4-BE49-F238E27FC236}">
+                <a16:creationId xmlns:a16="http://schemas.microsoft.com/office/drawing/2014/main" id="{1526866C-7DF0-A287-164D-6EC660324283}"/>
               </a:ext>
             </a:extLst>
           </p:cNvPr>
@@ -14035,7 +13351,7 @@
         </p:nvSpPr>
         <p:spPr>
           <a:xfrm rot="5400000">
-            <a:off x="9871906" y="1869865"/>
+            <a:off x="3733405" y="5369470"/>
             <a:ext cx="2291738" cy="369332"/>
           </a:xfrm>
           <a:prstGeom prst="rect">
@@ -14065,49 +13381,10 @@
       </p:sp>
       <p:pic>
         <p:nvPicPr>
-          <p:cNvPr id="10" name="Graphic 7">
-            <a:extLst>
-              <a:ext uri="{FF2B5EF4-FFF2-40B4-BE49-F238E27FC236}">
-                <a16:creationId xmlns:a16="http://schemas.microsoft.com/office/drawing/2014/main" id="{868BE020-CB17-DF72-BF7F-E2050D0F3317}"/>
-              </a:ext>
-            </a:extLst>
-          </p:cNvPr>
-          <p:cNvPicPr>
-            <a:picLocks noChangeAspect="1"/>
-          </p:cNvPicPr>
-          <p:nvPr/>
-        </p:nvPicPr>
-        <p:blipFill>
-          <a:blip r:embed="rId3" cstate="email">
-            <a:extLst>
-              <a:ext uri="{28A0092B-C50C-407E-A947-70E740481C1C}">
-                <a14:useLocalDpi xmlns:a14="http://schemas.microsoft.com/office/drawing/2010/main"/>
-              </a:ext>
-              <a:ext uri="{96DAC541-7B7A-43D3-8B79-37D633B846F1}">
-                <asvg:svgBlip xmlns:asvg="http://schemas.microsoft.com/office/drawing/2016/SVG/main" r:embed="rId4"/>
-              </a:ext>
-            </a:extLst>
-          </a:blip>
-          <a:stretch>
-            <a:fillRect/>
-          </a:stretch>
-        </p:blipFill>
-        <p:spPr>
-          <a:xfrm rot="9271734">
-            <a:off x="3841861" y="2746416"/>
-            <a:ext cx="4080257" cy="148725"/>
-          </a:xfrm>
-          <a:prstGeom prst="rect">
-            <a:avLst/>
-          </a:prstGeom>
-        </p:spPr>
-      </p:pic>
-      <p:pic>
-        <p:nvPicPr>
-          <p:cNvPr id="9" name="Obrázok 8">
-            <a:extLst>
-              <a:ext uri="{FF2B5EF4-FFF2-40B4-BE49-F238E27FC236}">
-                <a16:creationId xmlns:a16="http://schemas.microsoft.com/office/drawing/2014/main" id="{A882545B-4E89-D28D-7D71-98994BB8A769}"/>
+          <p:cNvPr id="7" name="Obrázok 6">
+            <a:extLst>
+              <a:ext uri="{FF2B5EF4-FFF2-40B4-BE49-F238E27FC236}">
+                <a16:creationId xmlns:a16="http://schemas.microsoft.com/office/drawing/2014/main" id="{682011CC-DBD7-91A9-A85A-837CA08A73AC}"/>
               </a:ext>
             </a:extLst>
           </p:cNvPr>
@@ -14118,13 +13395,13 @@
         </p:nvPicPr>
         <p:blipFill rotWithShape="1">
           <a:blip r:embed="rId5"/>
-          <a:srcRect l="7074" t="4295" r="7508" b="20395"/>
+          <a:srcRect l="-7" t="-200" r="393" b="-214"/>
           <a:stretch/>
         </p:blipFill>
         <p:spPr>
           <a:xfrm>
-            <a:off x="938590" y="2729600"/>
-            <a:ext cx="3035300" cy="3797300"/>
+            <a:off x="241706" y="255042"/>
+            <a:ext cx="4450026" cy="6361657"/>
           </a:xfrm>
           <a:prstGeom prst="rect">
             <a:avLst/>
@@ -14136,94 +13413,38 @@
           </a:ln>
         </p:spPr>
       </p:pic>
-      <p:pic>
-        <p:nvPicPr>
-          <p:cNvPr id="14" name="Obrázok 13">
-            <a:extLst>
-              <a:ext uri="{FF2B5EF4-FFF2-40B4-BE49-F238E27FC236}">
-                <a16:creationId xmlns:a16="http://schemas.microsoft.com/office/drawing/2014/main" id="{D93AF50A-B5E4-82B6-C259-A9B5CF434B6D}"/>
-              </a:ext>
-            </a:extLst>
-          </p:cNvPr>
-          <p:cNvPicPr>
-            <a:picLocks noChangeAspect="1"/>
-          </p:cNvPicPr>
+      <p:sp>
+        <p:nvSpPr>
+          <p:cNvPr id="4" name="BlokTextu 3">
+            <a:extLst>
+              <a:ext uri="{FF2B5EF4-FFF2-40B4-BE49-F238E27FC236}">
+                <a16:creationId xmlns:a16="http://schemas.microsoft.com/office/drawing/2014/main" id="{56ECC566-9E83-DD78-D793-0C5930F8253F}"/>
+              </a:ext>
+            </a:extLst>
+          </p:cNvPr>
+          <p:cNvSpPr txBox="1"/>
           <p:nvPr/>
-        </p:nvPicPr>
-        <p:blipFill rotWithShape="1">
-          <a:blip r:embed="rId6"/>
-          <a:srcRect l="7301" t="5413" r="8869" b="14188"/>
-          <a:stretch/>
-        </p:blipFill>
+        </p:nvSpPr>
         <p:spPr>
           <a:xfrm>
-            <a:off x="7768469" y="580343"/>
-            <a:ext cx="3035300" cy="4128401"/>
+            <a:off x="5635208" y="4479689"/>
+            <a:ext cx="6094562" cy="1674241"/>
           </a:xfrm>
           <a:prstGeom prst="rect">
             <a:avLst/>
           </a:prstGeom>
-          <a:ln>
-            <a:solidFill>
-              <a:schemeClr val="tx1"/>
-            </a:solidFill>
-          </a:ln>
-        </p:spPr>
-      </p:pic>
-      <p:sp>
-        <p:nvSpPr>
-          <p:cNvPr id="7" name="Nadpis 1">
-            <a:extLst>
-              <a:ext uri="{FF2B5EF4-FFF2-40B4-BE49-F238E27FC236}">
-                <a16:creationId xmlns:a16="http://schemas.microsoft.com/office/drawing/2014/main" id="{9C3335B3-7F3C-B663-8D6F-FCEE8F7C992E}"/>
-              </a:ext>
-            </a:extLst>
-          </p:cNvPr>
-          <p:cNvSpPr txBox="1">
-            <a:spLocks/>
-          </p:cNvSpPr>
-          <p:nvPr/>
-        </p:nvSpPr>
-        <p:spPr>
-          <a:xfrm>
-            <a:off x="4461049" y="5134781"/>
-            <a:ext cx="7271564" cy="994661"/>
-          </a:xfrm>
-          <a:prstGeom prst="rect">
-            <a:avLst/>
-          </a:prstGeom>
-        </p:spPr>
-        <p:txBody>
-          <a:bodyPr vert="horz" lIns="91440" tIns="45720" rIns="91440" bIns="45720" rtlCol="0" anchor="t">
-            <a:noAutofit/>
+          <a:noFill/>
+        </p:spPr>
+        <p:txBody>
+          <a:bodyPr wrap="square">
+            <a:spAutoFit/>
           </a:bodyPr>
-          <a:lstStyle>
-            <a:lvl1pPr algn="ctr" defTabSz="914400" rtl="0" eaLnBrk="1" latinLnBrk="0" hangingPunct="1">
+          <a:lstStyle/>
+          <a:p>
+            <a:pPr algn="r">
               <a:lnSpc>
-                <a:spcPct val="90000"/>
+                <a:spcPct val="200000"/>
               </a:lnSpc>
-              <a:spcBef>
-                <a:spcPct val="0"/>
-              </a:spcBef>
-              <a:buNone/>
-              <a:defRPr sz="6000" kern="1200">
-                <a:solidFill>
-                  <a:schemeClr val="tx1"/>
-                </a:solidFill>
-                <a:latin typeface="+mj-lt"/>
-                <a:ea typeface="+mj-ea"/>
-                <a:cs typeface="+mj-cs"/>
-              </a:defRPr>
-            </a:lvl1pPr>
-          </a:lstStyle>
-          <a:p>
-            <a:pPr algn="l">
-              <a:lnSpc>
-                <a:spcPct val="107000"/>
-              </a:lnSpc>
-              <a:spcAft>
-                <a:spcPts val="800"/>
-              </a:spcAft>
             </a:pPr>
             <a:r>
               <a:rPr lang="sk-SK" sz="1800" dirty="0">
@@ -14232,21 +13453,25 @@
                 </a:solidFill>
                 <a:effectLst/>
                 <a:latin typeface="Lucida Console" panose="020B0609040504020204" pitchFamily="49" charset="0"/>
-                <a:ea typeface="Calibri" panose="020F0502020204030204" pitchFamily="34" charset="0"/>
-                <a:cs typeface="Times New Roman" panose="02020603050405020304" pitchFamily="18" charset="0"/>
               </a:rPr>
-              <a:t>-čo pracovné listy obsahujú</a:t>
-            </a:r>
-          </a:p>
-          <a:p>
-            <a:pPr algn="l">
+              <a:t>-Aké sú to teoretické pracovné listy</a:t>
+            </a:r>
+          </a:p>
+          <a:p>
+            <a:pPr algn="r">
               <a:lnSpc>
-                <a:spcPct val="107000"/>
+                <a:spcPct val="200000"/>
               </a:lnSpc>
-              <a:spcAft>
-                <a:spcPts val="800"/>
-              </a:spcAft>
             </a:pPr>
+            <a:r>
+              <a:rPr lang="sk-SK" sz="1800" dirty="0">
+                <a:solidFill>
+                  <a:schemeClr val="bg1"/>
+                </a:solidFill>
+                <a:latin typeface="Lucida Console" panose="020B0609040504020204" pitchFamily="49" charset="0"/>
+              </a:rPr>
+              <a:t>-Ako sa delia </a:t>
+            </a:r>
             <a:r>
               <a:rPr lang="sk-SK" sz="1800" dirty="0">
                 <a:solidFill>
@@ -14254,10 +13479,25 @@
                 </a:solidFill>
                 <a:effectLst/>
                 <a:latin typeface="Lucida Console" panose="020B0609040504020204" pitchFamily="49" charset="0"/>
-                <a:ea typeface="Calibri" panose="020F0502020204030204" pitchFamily="34" charset="0"/>
-                <a:cs typeface="Times New Roman" panose="02020603050405020304" pitchFamily="18" charset="0"/>
               </a:rPr>
-              <a:t>-rozloženie a prevedenie pracovných listov</a:t>
+              <a:t>teoretické pracovné listy</a:t>
+            </a:r>
+          </a:p>
+          <a:p>
+            <a:pPr algn="r">
+              <a:lnSpc>
+                <a:spcPct val="200000"/>
+              </a:lnSpc>
+            </a:pPr>
+            <a:r>
+              <a:rPr lang="sk-SK" sz="1800" dirty="0">
+                <a:solidFill>
+                  <a:schemeClr val="bg1"/>
+                </a:solidFill>
+                <a:effectLst/>
+                <a:latin typeface="Lucida Console" panose="020B0609040504020204" pitchFamily="49" charset="0"/>
+              </a:rPr>
+              <a:t>-Čo obsahujú teoretické pracovné listy</a:t>
             </a:r>
           </a:p>
         </p:txBody>
@@ -14265,7 +13505,7 @@
     </p:spTree>
     <p:extLst>
       <p:ext uri="{BB962C8B-B14F-4D97-AF65-F5344CB8AC3E}">
-        <p14:creationId xmlns:p14="http://schemas.microsoft.com/office/powerpoint/2010/main" val="1218821964"/>
+        <p14:creationId xmlns:p14="http://schemas.microsoft.com/office/powerpoint/2010/main" val="2264328065"/>
       </p:ext>
     </p:extLst>
   </p:cSld>
@@ -14392,8 +13632,8 @@
         </p:nvSpPr>
         <p:spPr>
           <a:xfrm>
-            <a:off x="1335621" y="1033358"/>
-            <a:ext cx="10096798" cy="506077"/>
+            <a:off x="706971" y="728558"/>
+            <a:ext cx="7537894" cy="506077"/>
           </a:xfrm>
           <a:prstGeom prst="rect">
             <a:avLst/>
@@ -14423,7 +13663,7 @@
             </a:lvl1pPr>
           </a:lstStyle>
           <a:p>
-            <a:pPr algn="r"/>
+            <a:pPr algn="l"/>
             <a:r>
               <a:rPr lang="sk-SK" sz="6600" dirty="0">
                 <a:solidFill>
@@ -14432,43 +13672,81 @@
                 <a:latin typeface="Lucida Console" panose="020B0609040504020204" pitchFamily="49" charset="0"/>
                 <a:cs typeface="Segoe UI" panose="020B0502040204020203" pitchFamily="34" charset="0"/>
               </a:rPr>
-              <a:t>TEORETICKÉ</a:t>
-            </a:r>
-          </a:p>
-          <a:p>
-            <a:pPr algn="r"/>
-            <a:r>
-              <a:rPr lang="sk-SK" sz="6600" dirty="0">
-                <a:solidFill>
-                  <a:schemeClr val="bg1"/>
-                </a:solidFill>
-                <a:latin typeface="Lucida Console" panose="020B0609040504020204" pitchFamily="49" charset="0"/>
-                <a:cs typeface="Segoe UI" panose="020B0502040204020203" pitchFamily="34" charset="0"/>
-              </a:rPr>
-              <a:t>			PRACOVNÉ  	 	</a:t>
-            </a:r>
-          </a:p>
-          <a:p>
-            <a:pPr algn="r"/>
-            <a:r>
-              <a:rPr lang="sk-SK" sz="6600" dirty="0">
-                <a:solidFill>
-                  <a:schemeClr val="bg1"/>
-                </a:solidFill>
-                <a:latin typeface="Lucida Console" panose="020B0609040504020204" pitchFamily="49" charset="0"/>
-                <a:cs typeface="Segoe UI" panose="020B0502040204020203" pitchFamily="34" charset="0"/>
-              </a:rPr>
-              <a:t>LISTY					  </a:t>
-            </a:r>
+              <a:t>SPÄTNÁ VÄZBA</a:t>
+            </a:r>
+          </a:p>
+        </p:txBody>
+      </p:sp>
+      <p:sp>
+        <p:nvSpPr>
+          <p:cNvPr id="3" name="Obdĺžnik 2">
+            <a:extLst>
+              <a:ext uri="{FF2B5EF4-FFF2-40B4-BE49-F238E27FC236}">
+                <a16:creationId xmlns:a16="http://schemas.microsoft.com/office/drawing/2014/main" id="{9B90B492-1089-E563-F867-BD916C7A9F10}"/>
+              </a:ext>
+            </a:extLst>
+          </p:cNvPr>
+          <p:cNvSpPr/>
+          <p:nvPr/>
+        </p:nvSpPr>
+        <p:spPr>
+          <a:xfrm rot="16200000">
+            <a:off x="6994112" y="2376149"/>
+            <a:ext cx="9220123" cy="2105702"/>
+          </a:xfrm>
+          <a:prstGeom prst="rect">
+            <a:avLst/>
+          </a:prstGeom>
+          <a:gradFill>
+            <a:gsLst>
+              <a:gs pos="35000">
+                <a:srgbClr val="CCFF99">
+                  <a:lumMod val="96000"/>
+                </a:srgbClr>
+              </a:gs>
+              <a:gs pos="66000">
+                <a:schemeClr val="accent1"/>
+              </a:gs>
+            </a:gsLst>
+            <a:path path="circle">
+              <a:fillToRect l="100000" b="100000"/>
+            </a:path>
+          </a:gradFill>
+          <a:ln>
+            <a:noFill/>
+          </a:ln>
+        </p:spPr>
+        <p:style>
+          <a:lnRef idx="2">
+            <a:schemeClr val="accent1">
+              <a:shade val="50000"/>
+            </a:schemeClr>
+          </a:lnRef>
+          <a:fillRef idx="1">
+            <a:schemeClr val="accent1"/>
+          </a:fillRef>
+          <a:effectRef idx="0">
+            <a:schemeClr val="accent1"/>
+          </a:effectRef>
+          <a:fontRef idx="minor">
+            <a:schemeClr val="lt1"/>
+          </a:fontRef>
+        </p:style>
+        <p:txBody>
+          <a:bodyPr rtlCol="0" anchor="ctr"/>
+          <a:lstStyle/>
+          <a:p>
+            <a:pPr algn="ctr"/>
+            <a:endParaRPr lang="sk-SK"/>
           </a:p>
         </p:txBody>
       </p:sp>
       <p:pic>
         <p:nvPicPr>
-          <p:cNvPr id="3" name="Graphic 7">
-            <a:extLst>
-              <a:ext uri="{FF2B5EF4-FFF2-40B4-BE49-F238E27FC236}">
-                <a16:creationId xmlns:a16="http://schemas.microsoft.com/office/drawing/2014/main" id="{4B0E62A6-8B7A-7BE9-47A6-CBD705143B10}"/>
+          <p:cNvPr id="16" name="Graphic 7">
+            <a:extLst>
+              <a:ext uri="{FF2B5EF4-FFF2-40B4-BE49-F238E27FC236}">
+                <a16:creationId xmlns:a16="http://schemas.microsoft.com/office/drawing/2014/main" id="{1CEA1227-056B-947D-5534-D541F18D68DB}"/>
               </a:ext>
             </a:extLst>
           </p:cNvPr>
@@ -14493,9 +13771,9 @@
           </a:stretch>
         </p:blipFill>
         <p:spPr>
-          <a:xfrm rot="9275962">
-            <a:off x="6976439" y="2744195"/>
-            <a:ext cx="4880564" cy="177896"/>
+          <a:xfrm rot="5400000" flipV="1">
+            <a:off x="7064697" y="3299698"/>
+            <a:ext cx="6572253" cy="239558"/>
           </a:xfrm>
           <a:prstGeom prst="rect">
             <a:avLst/>
@@ -14504,32 +13782,90 @@
       </p:pic>
       <p:sp>
         <p:nvSpPr>
-          <p:cNvPr id="6" name="BlokTextu 5">
-            <a:extLst>
-              <a:ext uri="{FF2B5EF4-FFF2-40B4-BE49-F238E27FC236}">
-                <a16:creationId xmlns:a16="http://schemas.microsoft.com/office/drawing/2014/main" id="{1526866C-7DF0-A287-164D-6EC660324283}"/>
-              </a:ext>
-            </a:extLst>
-          </p:cNvPr>
-          <p:cNvSpPr txBox="1"/>
+          <p:cNvPr id="12" name="Nadpis 1">
+            <a:extLst>
+              <a:ext uri="{FF2B5EF4-FFF2-40B4-BE49-F238E27FC236}">
+                <a16:creationId xmlns:a16="http://schemas.microsoft.com/office/drawing/2014/main" id="{373E9CF8-810A-B420-CAB9-95D61B53A7EB}"/>
+              </a:ext>
+            </a:extLst>
+          </p:cNvPr>
+          <p:cNvSpPr txBox="1">
+            <a:spLocks/>
+          </p:cNvSpPr>
           <p:nvPr/>
         </p:nvSpPr>
         <p:spPr>
-          <a:xfrm rot="5400000">
-            <a:off x="3733405" y="5369470"/>
-            <a:ext cx="2291738" cy="369332"/>
+          <a:xfrm>
+            <a:off x="490462" y="2160061"/>
+            <a:ext cx="9275557" cy="3750844"/>
           </a:xfrm>
           <a:prstGeom prst="rect">
             <a:avLst/>
           </a:prstGeom>
-          <a:noFill/>
-        </p:spPr>
-        <p:txBody>
-          <a:bodyPr wrap="square" rtlCol="0">
-            <a:spAutoFit/>
+        </p:spPr>
+        <p:txBody>
+          <a:bodyPr vert="horz" lIns="91440" tIns="45720" rIns="91440" bIns="45720" rtlCol="0" anchor="t">
+            <a:noAutofit/>
           </a:bodyPr>
-          <a:lstStyle/>
-          <a:p>
+          <a:lstStyle>
+            <a:lvl1pPr algn="ctr" defTabSz="914400" rtl="0" eaLnBrk="1" latinLnBrk="0" hangingPunct="1">
+              <a:lnSpc>
+                <a:spcPct val="90000"/>
+              </a:lnSpc>
+              <a:spcBef>
+                <a:spcPct val="0"/>
+              </a:spcBef>
+              <a:buNone/>
+              <a:defRPr sz="6000" kern="1200">
+                <a:solidFill>
+                  <a:schemeClr val="tx1"/>
+                </a:solidFill>
+                <a:latin typeface="+mj-lt"/>
+                <a:ea typeface="+mj-ea"/>
+                <a:cs typeface="+mj-cs"/>
+              </a:defRPr>
+            </a:lvl1pPr>
+          </a:lstStyle>
+          <a:p>
+            <a:pPr algn="l"/>
+            <a:r>
+              <a:rPr lang="sk-SK" sz="2400" dirty="0">
+                <a:solidFill>
+                  <a:schemeClr val="bg1"/>
+                </a:solidFill>
+                <a:effectLst/>
+                <a:latin typeface="Lucida Console" panose="020B0609040504020204" pitchFamily="49" charset="0"/>
+              </a:rPr>
+              <a:t>Spätná väzba zahŕňa:</a:t>
+            </a:r>
+          </a:p>
+          <a:p>
+            <a:pPr algn="l"/>
+            <a:endParaRPr lang="sk-SK" sz="1800" dirty="0">
+              <a:solidFill>
+                <a:schemeClr val="bg1"/>
+              </a:solidFill>
+              <a:latin typeface="Lucida Console" panose="020B0609040504020204" pitchFamily="49" charset="0"/>
+            </a:endParaRPr>
+          </a:p>
+          <a:p>
+            <a:pPr algn="l"/>
+            <a:endParaRPr lang="sk-SK" sz="1800" dirty="0">
+              <a:solidFill>
+                <a:schemeClr val="bg1"/>
+              </a:solidFill>
+              <a:latin typeface="Lucida Console" panose="020B0609040504020204" pitchFamily="49" charset="0"/>
+            </a:endParaRPr>
+          </a:p>
+          <a:p>
+            <a:pPr algn="l">
+              <a:lnSpc>
+                <a:spcPct val="100000"/>
+              </a:lnSpc>
+              <a:spcBef>
+                <a:spcPts val="300"/>
+              </a:spcBef>
+            </a:pPr>
             <a:r>
               <a:rPr lang="sk-SK" sz="1800" dirty="0">
                 <a:solidFill>
@@ -14538,78 +13874,40 @@
                 <a:effectLst/>
                 <a:latin typeface="Lucida Console" panose="020B0609040504020204" pitchFamily="49" charset="0"/>
               </a:rPr>
-              <a:t>Teoretický list</a:t>
-            </a:r>
-            <a:endParaRPr lang="sk-SK" dirty="0"/>
-          </a:p>
-        </p:txBody>
-      </p:sp>
-      <p:pic>
-        <p:nvPicPr>
-          <p:cNvPr id="7" name="Obrázok 6">
-            <a:extLst>
-              <a:ext uri="{FF2B5EF4-FFF2-40B4-BE49-F238E27FC236}">
-                <a16:creationId xmlns:a16="http://schemas.microsoft.com/office/drawing/2014/main" id="{682011CC-DBD7-91A9-A85A-837CA08A73AC}"/>
-              </a:ext>
-            </a:extLst>
-          </p:cNvPr>
-          <p:cNvPicPr>
-            <a:picLocks noChangeAspect="1"/>
-          </p:cNvPicPr>
-          <p:nvPr/>
-        </p:nvPicPr>
-        <p:blipFill rotWithShape="1">
-          <a:blip r:embed="rId5"/>
-          <a:srcRect l="-7" t="-200" r="393" b="-214"/>
-          <a:stretch/>
-        </p:blipFill>
-        <p:spPr>
-          <a:xfrm>
-            <a:off x="241706" y="255042"/>
-            <a:ext cx="4450026" cy="6361657"/>
-          </a:xfrm>
-          <a:prstGeom prst="rect">
-            <a:avLst/>
-          </a:prstGeom>
-          <a:ln>
-            <a:solidFill>
-              <a:schemeClr val="tx1"/>
-            </a:solidFill>
-          </a:ln>
-        </p:spPr>
-      </p:pic>
-      <p:sp>
-        <p:nvSpPr>
-          <p:cNvPr id="4" name="BlokTextu 3">
-            <a:extLst>
-              <a:ext uri="{FF2B5EF4-FFF2-40B4-BE49-F238E27FC236}">
-                <a16:creationId xmlns:a16="http://schemas.microsoft.com/office/drawing/2014/main" id="{56ECC566-9E83-DD78-D793-0C5930F8253F}"/>
-              </a:ext>
-            </a:extLst>
-          </p:cNvPr>
-          <p:cNvSpPr txBox="1"/>
-          <p:nvPr/>
-        </p:nvSpPr>
-        <p:spPr>
-          <a:xfrm>
-            <a:off x="5635208" y="4479689"/>
-            <a:ext cx="6094562" cy="1674241"/>
-          </a:xfrm>
-          <a:prstGeom prst="rect">
-            <a:avLst/>
-          </a:prstGeom>
-          <a:noFill/>
-        </p:spPr>
-        <p:txBody>
-          <a:bodyPr wrap="square">
-            <a:spAutoFit/>
-          </a:bodyPr>
-          <a:lstStyle/>
-          <a:p>
-            <a:pPr algn="r">
+              <a:t>   -kontrolu pracovných listov na našich spolužiakoch</a:t>
+            </a:r>
+            <a:endParaRPr lang="sk-SK" sz="1800" dirty="0">
+              <a:solidFill>
+                <a:schemeClr val="bg1"/>
+              </a:solidFill>
+              <a:latin typeface="Lucida Console" panose="020B0609040504020204" pitchFamily="49" charset="0"/>
+            </a:endParaRPr>
+          </a:p>
+          <a:p>
+            <a:pPr algn="l">
               <a:lnSpc>
-                <a:spcPct val="200000"/>
+                <a:spcPct val="100000"/>
               </a:lnSpc>
+              <a:spcBef>
+                <a:spcPts val="300"/>
+              </a:spcBef>
+            </a:pPr>
+            <a:endParaRPr lang="sk-SK" sz="1800" dirty="0">
+              <a:solidFill>
+                <a:schemeClr val="bg1"/>
+              </a:solidFill>
+              <a:effectLst/>
+              <a:latin typeface="Lucida Console" panose="020B0609040504020204" pitchFamily="49" charset="0"/>
+            </a:endParaRPr>
+          </a:p>
+          <a:p>
+            <a:pPr algn="l">
+              <a:lnSpc>
+                <a:spcPct val="100000"/>
+              </a:lnSpc>
+              <a:spcBef>
+                <a:spcPts val="300"/>
+              </a:spcBef>
             </a:pPr>
             <a:r>
               <a:rPr lang="sk-SK" sz="1800" dirty="0">
@@ -14619,14 +13917,33 @@
                 <a:effectLst/>
                 <a:latin typeface="Lucida Console" panose="020B0609040504020204" pitchFamily="49" charset="0"/>
               </a:rPr>
-              <a:t>-Aké sú to teoretické pracovné listy</a:t>
-            </a:r>
-          </a:p>
-          <a:p>
-            <a:pPr algn="r">
+              <a:t>   -vyplnenie dotazníka spolužiakmi</a:t>
+            </a:r>
+          </a:p>
+          <a:p>
+            <a:pPr algn="l">
               <a:lnSpc>
-                <a:spcPct val="200000"/>
+                <a:spcPct val="100000"/>
               </a:lnSpc>
+              <a:spcBef>
+                <a:spcPts val="300"/>
+              </a:spcBef>
+            </a:pPr>
+            <a:endParaRPr lang="sk-SK" sz="1800" dirty="0">
+              <a:solidFill>
+                <a:schemeClr val="bg1"/>
+              </a:solidFill>
+              <a:latin typeface="Lucida Console" panose="020B0609040504020204" pitchFamily="49" charset="0"/>
+            </a:endParaRPr>
+          </a:p>
+          <a:p>
+            <a:pPr algn="l">
+              <a:lnSpc>
+                <a:spcPct val="100000"/>
+              </a:lnSpc>
+              <a:spcBef>
+                <a:spcPts val="300"/>
+              </a:spcBef>
             </a:pPr>
             <a:r>
               <a:rPr lang="sk-SK" sz="1800" dirty="0">
@@ -14635,8 +13952,35 @@
                 </a:solidFill>
                 <a:latin typeface="Lucida Console" panose="020B0609040504020204" pitchFamily="49" charset="0"/>
               </a:rPr>
-              <a:t>-Ako sa delia </a:t>
-            </a:r>
+              <a:t>   -vyhodnotenie pripomienok spolužiakov</a:t>
+            </a:r>
+          </a:p>
+          <a:p>
+            <a:pPr algn="l">
+              <a:lnSpc>
+                <a:spcPct val="100000"/>
+              </a:lnSpc>
+              <a:spcBef>
+                <a:spcPts val="300"/>
+              </a:spcBef>
+            </a:pPr>
+            <a:endParaRPr lang="sk-SK" sz="1800" dirty="0">
+              <a:solidFill>
+                <a:schemeClr val="bg1"/>
+              </a:solidFill>
+              <a:effectLst/>
+              <a:latin typeface="Lucida Console" panose="020B0609040504020204" pitchFamily="49" charset="0"/>
+            </a:endParaRPr>
+          </a:p>
+          <a:p>
+            <a:pPr algn="l">
+              <a:lnSpc>
+                <a:spcPct val="100000"/>
+              </a:lnSpc>
+              <a:spcBef>
+                <a:spcPts val="300"/>
+              </a:spcBef>
+            </a:pPr>
             <a:r>
               <a:rPr lang="sk-SK" sz="1800" dirty="0">
                 <a:solidFill>
@@ -14645,24 +13989,7 @@
                 <a:effectLst/>
                 <a:latin typeface="Lucida Console" panose="020B0609040504020204" pitchFamily="49" charset="0"/>
               </a:rPr>
-              <a:t>teoretické pracovné listy</a:t>
-            </a:r>
-          </a:p>
-          <a:p>
-            <a:pPr algn="r">
-              <a:lnSpc>
-                <a:spcPct val="200000"/>
-              </a:lnSpc>
-            </a:pPr>
-            <a:r>
-              <a:rPr lang="sk-SK" sz="1800" dirty="0">
-                <a:solidFill>
-                  <a:schemeClr val="bg1"/>
-                </a:solidFill>
-                <a:effectLst/>
-                <a:latin typeface="Lucida Console" panose="020B0609040504020204" pitchFamily="49" charset="0"/>
-              </a:rPr>
-              <a:t>-Čo obsahujú teoretické pracovné listy</a:t>
+              <a:t>   -úprava pracovných listov podľa výsledkov z dotazníka</a:t>
             </a:r>
           </a:p>
         </p:txBody>
@@ -14670,7 +13997,7 @@
     </p:spTree>
     <p:extLst>
       <p:ext uri="{BB962C8B-B14F-4D97-AF65-F5344CB8AC3E}">
-        <p14:creationId xmlns:p14="http://schemas.microsoft.com/office/powerpoint/2010/main" val="2264328065"/>
+        <p14:creationId xmlns:p14="http://schemas.microsoft.com/office/powerpoint/2010/main" val="2186824041"/>
       </p:ext>
     </p:extLst>
   </p:cSld>

</xml_diff>